<commit_message>
add code for sixth lesson
</commit_message>
<xml_diff>
--- a/006/lesson_6.pptx
+++ b/006/lesson_6.pptx
@@ -35,7 +35,7 @@
       <p:regular r:id="rId21"/>
     </p:embeddedFont>
     <p:embeddedFont>
-      <p:font typeface="Aldrich" panose="020B0604020202020204" charset="0"/>
+      <p:font typeface="Aldrich" panose="02000000000000000000" pitchFamily="2" charset="0"/>
       <p:regular r:id="rId22"/>
     </p:embeddedFont>
     <p:embeddedFont>
@@ -9435,7 +9435,7 @@
             </a:pPr>
             <a:fld id="{00000000-1234-1234-1234-123412341234}" type="slidenum">
               <a:rPr lang="en"/>
-              <a:t>‹Nr.›</a:t>
+              <a:t>‹#›</a:t>
             </a:fld>
             <a:endParaRPr/>
           </a:p>
@@ -20897,10 +20897,10 @@
       </p:sp>
       <p:pic>
         <p:nvPicPr>
-          <p:cNvPr id="19" name="Picture 18">
+          <p:cNvPr id="3" name="Picture 2">
             <a:extLst>
               <a:ext uri="{FF2B5EF4-FFF2-40B4-BE49-F238E27FC236}">
-                <a16:creationId xmlns:a16="http://schemas.microsoft.com/office/drawing/2014/main" id="{3362069D-C9B2-B587-252C-8E37DAD8D774}"/>
+                <a16:creationId xmlns:a16="http://schemas.microsoft.com/office/drawing/2014/main" id="{8AB6158A-4E57-95CE-6E34-16A3F99AE37B}"/>
               </a:ext>
             </a:extLst>
           </p:cNvPr>
@@ -20917,8 +20917,8 @@
         </p:blipFill>
         <p:spPr>
           <a:xfrm>
-            <a:off x="476250" y="1781175"/>
-            <a:ext cx="11372850" cy="3905250"/>
+            <a:off x="1260590" y="1629987"/>
+            <a:ext cx="9670820" cy="4588017"/>
           </a:xfrm>
           <a:prstGeom prst="rect">
             <a:avLst/>

</xml_diff>